<commit_message>
Added names of webbinar leads to presentation
</commit_message>
<xml_diff>
--- a/pipeline_products_session/jwebbinar-intro-to-resources.pptx
+++ b/pipeline_products_session/jwebbinar-intro-to-resources.pptx
@@ -15180,7 +15180,7 @@
           <a:p>
             <a:fld id="{A397BD10-E2AF-1D41-B437-33796279AD29}" type="datetimeFigureOut">
               <a:rPr lang="en-US" smtClean="0"/>
-              <a:t>3/2/21</a:t>
+              <a:t>3/25/21</a:t>
             </a:fld>
             <a:endParaRPr lang="en-US" dirty="0"/>
           </a:p>
@@ -17285,7 +17285,10 @@
             <a:br>
               <a:rPr lang="en-US" dirty="0"/>
             </a:br>
-            <a:endParaRPr lang="en-US" sz="2000" dirty="0"/>
+            <a:r>
+              <a:rPr lang="en-US" sz="1500" dirty="0"/>
+              <a:t>Karl Gordon, Anton Koekemoer, Alicia Canipe, Bryan Hilbert, Misty Cracraft</a:t>
+            </a:r>
           </a:p>
         </p:txBody>
       </p:sp>

</xml_diff>